<commit_message>
Update Changes in Apresentação
</commit_message>
<xml_diff>
--- a/Apresentacao_Alerta_academico.pptx
+++ b/Apresentacao_Alerta_academico.pptx
@@ -5,7 +5,7 @@
     <p:sldMasterId id="2147483672" r:id="rId1"/>
   </p:sldMasterIdLst>
   <p:notesMasterIdLst>
-    <p:notesMasterId r:id="rId10"/>
+    <p:notesMasterId r:id="rId11"/>
   </p:notesMasterIdLst>
   <p:sldIdLst>
     <p:sldId id="256" r:id="rId2"/>
@@ -15,32 +15,33 @@
     <p:sldId id="264" r:id="rId6"/>
     <p:sldId id="312" r:id="rId7"/>
     <p:sldId id="266" r:id="rId8"/>
-    <p:sldId id="283" r:id="rId9"/>
+    <p:sldId id="313" r:id="rId9"/>
+    <p:sldId id="283" r:id="rId10"/>
   </p:sldIdLst>
   <p:sldSz cx="9144000" cy="5143500" type="screen16x9"/>
   <p:notesSz cx="6858000" cy="9144000"/>
   <p:embeddedFontLst>
     <p:embeddedFont>
       <p:font typeface="Chelsea Market" panose="020B0604020202020204" charset="0"/>
-      <p:regular r:id="rId11"/>
+      <p:regular r:id="rId12"/>
     </p:embeddedFont>
     <p:embeddedFont>
       <p:font typeface="Fredoka One" panose="02000000000000000000" pitchFamily="2" charset="0"/>
-      <p:regular r:id="rId12"/>
+      <p:regular r:id="rId13"/>
     </p:embeddedFont>
     <p:embeddedFont>
       <p:font typeface="KoHo Medium" panose="020B0604020202020204" charset="-34"/>
-      <p:regular r:id="rId13"/>
-      <p:bold r:id="rId14"/>
-      <p:italic r:id="rId15"/>
-      <p:boldItalic r:id="rId16"/>
+      <p:regular r:id="rId14"/>
+      <p:bold r:id="rId15"/>
+      <p:italic r:id="rId16"/>
+      <p:boldItalic r:id="rId17"/>
     </p:embeddedFont>
     <p:embeddedFont>
       <p:font typeface="Mali" panose="020B0604020202020204" charset="-34"/>
-      <p:regular r:id="rId17"/>
-      <p:bold r:id="rId18"/>
-      <p:italic r:id="rId19"/>
-      <p:boldItalic r:id="rId20"/>
+      <p:regular r:id="rId18"/>
+      <p:bold r:id="rId19"/>
+      <p:italic r:id="rId20"/>
+      <p:boldItalic r:id="rId21"/>
     </p:embeddedFont>
   </p:embeddedFontLst>
   <p:defaultTextStyle>
@@ -1466,6 +1467,115 @@
 </file>
 
 <file path=ppt/notesSlides/notesSlide8.xml><?xml version="1.0" encoding="utf-8"?>
+<p:notes xmlns:a="http://schemas.openxmlformats.org/drawingml/2006/main" xmlns:r="http://schemas.openxmlformats.org/officeDocument/2006/relationships" xmlns:p="http://schemas.openxmlformats.org/presentationml/2006/main" showMasterSp="0" showMasterPhAnim="0">
+  <p:cSld>
+    <p:spTree>
+      <p:nvGrpSpPr>
+        <p:cNvPr id="1" name="Shape 924"/>
+        <p:cNvGrpSpPr/>
+        <p:nvPr/>
+      </p:nvGrpSpPr>
+      <p:grpSpPr>
+        <a:xfrm>
+          <a:off x="0" y="0"/>
+          <a:ext cx="0" cy="0"/>
+          <a:chOff x="0" y="0"/>
+          <a:chExt cx="0" cy="0"/>
+        </a:xfrm>
+      </p:grpSpPr>
+      <p:sp>
+        <p:nvSpPr>
+          <p:cNvPr id="925" name="Google Shape;925;g8c07504a49_0_625:notes"/>
+          <p:cNvSpPr>
+            <a:spLocks noGrp="1" noRot="1" noChangeAspect="1"/>
+          </p:cNvSpPr>
+          <p:nvPr>
+            <p:ph type="sldImg" idx="2"/>
+          </p:nvPr>
+        </p:nvSpPr>
+        <p:spPr>
+          <a:xfrm>
+            <a:off x="381000" y="685800"/>
+            <a:ext cx="6096000" cy="3429000"/>
+          </a:xfrm>
+          <a:custGeom>
+            <a:avLst/>
+            <a:gdLst/>
+            <a:ahLst/>
+            <a:cxnLst/>
+            <a:rect l="l" t="t" r="r" b="b"/>
+            <a:pathLst>
+              <a:path w="120000" h="120000" extrusionOk="0">
+                <a:moveTo>
+                  <a:pt x="0" y="0"/>
+                </a:moveTo>
+                <a:lnTo>
+                  <a:pt x="120000" y="0"/>
+                </a:lnTo>
+                <a:lnTo>
+                  <a:pt x="120000" y="120000"/>
+                </a:lnTo>
+                <a:lnTo>
+                  <a:pt x="0" y="120000"/>
+                </a:lnTo>
+                <a:close/>
+              </a:path>
+            </a:pathLst>
+          </a:custGeom>
+        </p:spPr>
+      </p:sp>
+      <p:sp>
+        <p:nvSpPr>
+          <p:cNvPr id="926" name="Google Shape;926;g8c07504a49_0_625:notes"/>
+          <p:cNvSpPr txBox="1">
+            <a:spLocks noGrp="1"/>
+          </p:cNvSpPr>
+          <p:nvPr>
+            <p:ph type="body" idx="1"/>
+          </p:nvPr>
+        </p:nvSpPr>
+        <p:spPr>
+          <a:xfrm>
+            <a:off x="685800" y="4343400"/>
+            <a:ext cx="5486400" cy="4114800"/>
+          </a:xfrm>
+          <a:prstGeom prst="rect">
+            <a:avLst/>
+          </a:prstGeom>
+        </p:spPr>
+        <p:txBody>
+          <a:bodyPr spcFirstLastPara="1" wrap="square" lIns="91425" tIns="91425" rIns="91425" bIns="91425" anchor="t" anchorCtr="0">
+            <a:noAutofit/>
+          </a:bodyPr>
+          <a:lstStyle/>
+          <a:p>
+            <a:pPr marL="0" lvl="0" indent="0" algn="l" rtl="0">
+              <a:spcBef>
+                <a:spcPts val="0"/>
+              </a:spcBef>
+              <a:spcAft>
+                <a:spcPts val="0"/>
+              </a:spcAft>
+              <a:buNone/>
+            </a:pPr>
+            <a:endParaRPr dirty="0"/>
+          </a:p>
+        </p:txBody>
+      </p:sp>
+    </p:spTree>
+    <p:extLst>
+      <p:ext uri="{BB962C8B-B14F-4D97-AF65-F5344CB8AC3E}">
+        <p14:creationId xmlns:p14="http://schemas.microsoft.com/office/powerpoint/2010/main" val="1993357198"/>
+      </p:ext>
+    </p:extLst>
+  </p:cSld>
+  <p:clrMapOvr>
+    <a:masterClrMapping/>
+  </p:clrMapOvr>
+</p:notes>
+</file>
+
+<file path=ppt/notesSlides/notesSlide9.xml><?xml version="1.0" encoding="utf-8"?>
 <p:notes xmlns:a="http://schemas.openxmlformats.org/drawingml/2006/main" xmlns:r="http://schemas.openxmlformats.org/officeDocument/2006/relationships" xmlns:p="http://schemas.openxmlformats.org/presentationml/2006/main" showMasterSp="0" showMasterPhAnim="0">
   <p:cSld>
     <p:spTree>
@@ -44230,7 +44340,7 @@
         </p:nvSpPr>
         <p:spPr>
           <a:xfrm>
-            <a:off x="5268545" y="2480666"/>
+            <a:off x="5257787" y="2469908"/>
             <a:ext cx="1698000" cy="446100"/>
           </a:xfrm>
           <a:prstGeom prst="rect">
@@ -44254,7 +44364,7 @@
             </a:pPr>
             <a:r>
               <a:rPr lang="en" b="1" dirty="0"/>
-              <a:t>JavaScript</a:t>
+              <a:t>HTML e CSS</a:t>
             </a:r>
             <a:r>
               <a:rPr lang="en" dirty="0"/>
@@ -54904,6 +55014,196 @@
   <p:cSld>
     <p:spTree>
       <p:nvGrpSpPr>
+        <p:cNvPr id="1" name="Shape 927"/>
+        <p:cNvGrpSpPr/>
+        <p:nvPr/>
+      </p:nvGrpSpPr>
+      <p:grpSpPr>
+        <a:xfrm>
+          <a:off x="0" y="0"/>
+          <a:ext cx="0" cy="0"/>
+          <a:chOff x="0" y="0"/>
+          <a:chExt cx="0" cy="0"/>
+        </a:xfrm>
+      </p:grpSpPr>
+      <p:sp>
+        <p:nvSpPr>
+          <p:cNvPr id="935" name="Google Shape;935;p37"/>
+          <p:cNvSpPr txBox="1">
+            <a:spLocks noGrp="1"/>
+          </p:cNvSpPr>
+          <p:nvPr>
+            <p:ph type="title"/>
+          </p:nvPr>
+        </p:nvSpPr>
+        <p:spPr>
+          <a:prstGeom prst="rect">
+            <a:avLst/>
+          </a:prstGeom>
+        </p:spPr>
+        <p:txBody>
+          <a:bodyPr spcFirstLastPara="1" wrap="square" lIns="91425" tIns="91425" rIns="91425" bIns="91425" anchor="t" anchorCtr="0">
+            <a:noAutofit/>
+          </a:bodyPr>
+          <a:lstStyle/>
+          <a:p>
+            <a:pPr marL="0" lvl="0" indent="0" algn="ctr" rtl="0">
+              <a:spcBef>
+                <a:spcPts val="0"/>
+              </a:spcBef>
+              <a:spcAft>
+                <a:spcPts val="0"/>
+              </a:spcAft>
+              <a:buNone/>
+            </a:pPr>
+            <a:r>
+              <a:rPr lang="en" dirty="0"/>
+              <a:t>Fluxograma </a:t>
+            </a:r>
+            <a:endParaRPr dirty="0"/>
+          </a:p>
+        </p:txBody>
+      </p:sp>
+      <p:sp>
+        <p:nvSpPr>
+          <p:cNvPr id="3" name="Caixa de Texto 1">
+            <a:extLst>
+              <a:ext uri="{FF2B5EF4-FFF2-40B4-BE49-F238E27FC236}">
+                <a16:creationId xmlns:a16="http://schemas.microsoft.com/office/drawing/2014/main" id="{F0E5303B-C535-8A09-AE71-CEE64D2A683D}"/>
+              </a:ext>
+            </a:extLst>
+          </p:cNvPr>
+          <p:cNvSpPr txBox="1"/>
+          <p:nvPr/>
+        </p:nvSpPr>
+        <p:spPr>
+          <a:xfrm>
+            <a:off x="978276" y="4552009"/>
+            <a:ext cx="7187398" cy="507831"/>
+          </a:xfrm>
+          <a:prstGeom prst="rect">
+            <a:avLst/>
+          </a:prstGeom>
+          <a:solidFill>
+            <a:prstClr val="white"/>
+          </a:solidFill>
+          <a:ln>
+            <a:noFill/>
+          </a:ln>
+        </p:spPr>
+        <p:txBody>
+          <a:bodyPr rot="0" spcFirstLastPara="0" vert="horz" wrap="square" lIns="0" tIns="0" rIns="0" bIns="0" numCol="1" spcCol="0" rtlCol="0" fromWordArt="0" anchor="t" anchorCtr="0" forceAA="0" compatLnSpc="1">
+            <a:prstTxWarp prst="textNoShape">
+              <a:avLst/>
+            </a:prstTxWarp>
+            <a:spAutoFit/>
+          </a:bodyPr>
+          <a:lstStyle/>
+          <a:p>
+            <a:pPr algn="ctr">
+              <a:spcAft>
+                <a:spcPts val="1000"/>
+              </a:spcAft>
+            </a:pPr>
+            <a:r>
+              <a:rPr lang="pt-BR" sz="1100" i="1" kern="100" dirty="0">
+                <a:effectLst/>
+                <a:latin typeface="Times New Roman" panose="02020603050405020304" pitchFamily="18" charset="0"/>
+                <a:ea typeface="Cambria" panose="02040503050406030204" pitchFamily="18" charset="0"/>
+              </a:rPr>
+              <a:t>Figura 2: Fluxograma do Aplicativo “Alerta Acadêmico UFPE ” ilustrando o processo de gerenciamento de frequência</a:t>
+            </a:r>
+            <a:r>
+              <a:rPr lang="pt-BR" sz="1100" i="1" kern="100" dirty="0">
+                <a:latin typeface="Times New Roman" panose="02020603050405020304" pitchFamily="18" charset="0"/>
+                <a:ea typeface="Cambria" panose="02040503050406030204" pitchFamily="18" charset="0"/>
+              </a:rPr>
+              <a:t>: desde a seleção da disciplina e registro de ausência , passando pelo calculo da porcentagem de faltas, até o envio da notificação proativa</a:t>
+            </a:r>
+            <a:endParaRPr lang="pt-BR" sz="1100" i="1" kern="100" dirty="0">
+              <a:effectLst/>
+              <a:latin typeface="Times New Roman" panose="02020603050405020304" pitchFamily="18" charset="0"/>
+              <a:ea typeface="Cambria" panose="02040503050406030204" pitchFamily="18" charset="0"/>
+            </a:endParaRPr>
+          </a:p>
+        </p:txBody>
+      </p:sp>
+      <p:pic>
+        <p:nvPicPr>
+          <p:cNvPr id="5" name="Imagem 4">
+            <a:extLst>
+              <a:ext uri="{FF2B5EF4-FFF2-40B4-BE49-F238E27FC236}">
+                <a16:creationId xmlns:a16="http://schemas.microsoft.com/office/drawing/2014/main" id="{9D192BB5-AB48-F6C7-6911-1E820023DDCE}"/>
+              </a:ext>
+            </a:extLst>
+          </p:cNvPr>
+          <p:cNvPicPr>
+            <a:picLocks noChangeAspect="1"/>
+          </p:cNvPicPr>
+          <p:nvPr/>
+        </p:nvPicPr>
+        <p:blipFill rotWithShape="1">
+          <a:blip r:embed="rId3"/>
+          <a:srcRect l="1" t="13386" r="1463"/>
+          <a:stretch/>
+        </p:blipFill>
+        <p:spPr>
+          <a:xfrm>
+            <a:off x="1923132" y="1166293"/>
+            <a:ext cx="2048365" cy="3264397"/>
+          </a:xfrm>
+          <a:prstGeom prst="rect">
+            <a:avLst/>
+          </a:prstGeom>
+        </p:spPr>
+      </p:pic>
+      <p:pic>
+        <p:nvPicPr>
+          <p:cNvPr id="7" name="Imagem 6">
+            <a:extLst>
+              <a:ext uri="{FF2B5EF4-FFF2-40B4-BE49-F238E27FC236}">
+                <a16:creationId xmlns:a16="http://schemas.microsoft.com/office/drawing/2014/main" id="{AD3A8755-5454-EAF0-E02A-8E7141F92BC1}"/>
+              </a:ext>
+            </a:extLst>
+          </p:cNvPr>
+          <p:cNvPicPr>
+            <a:picLocks noChangeAspect="1"/>
+          </p:cNvPicPr>
+          <p:nvPr/>
+        </p:nvPicPr>
+        <p:blipFill rotWithShape="1">
+          <a:blip r:embed="rId4"/>
+          <a:srcRect b="11500"/>
+          <a:stretch/>
+        </p:blipFill>
+        <p:spPr>
+          <a:xfrm>
+            <a:off x="4571975" y="1131974"/>
+            <a:ext cx="2898220" cy="3395152"/>
+          </a:xfrm>
+          <a:prstGeom prst="rect">
+            <a:avLst/>
+          </a:prstGeom>
+        </p:spPr>
+      </p:pic>
+    </p:spTree>
+    <p:extLst>
+      <p:ext uri="{BB962C8B-B14F-4D97-AF65-F5344CB8AC3E}">
+        <p14:creationId xmlns:p14="http://schemas.microsoft.com/office/powerpoint/2010/main" val="2392890257"/>
+      </p:ext>
+    </p:extLst>
+  </p:cSld>
+  <p:clrMapOvr>
+    <a:masterClrMapping/>
+  </p:clrMapOvr>
+</p:sld>
+</file>
+
+<file path=ppt/slides/slide9.xml><?xml version="1.0" encoding="utf-8"?>
+<p:sld xmlns:a="http://schemas.openxmlformats.org/drawingml/2006/main" xmlns:r="http://schemas.openxmlformats.org/officeDocument/2006/relationships" xmlns:p="http://schemas.openxmlformats.org/presentationml/2006/main">
+  <p:cSld>
+    <p:spTree>
+      <p:nvGrpSpPr>
         <p:cNvPr id="1" name="Shape 1945"/>
         <p:cNvGrpSpPr/>
         <p:nvPr/>

</xml_diff>